<commit_message>
Du an Shop ban trai cay
</commit_message>
<xml_diff>
--- a/B1900241_Phan Thái Hiền_B1910276_DươngViệtPhát.pptx
+++ b/B1900241_Phan Thái Hiền_B1910276_DươngViệtPhát.pptx
@@ -3709,7 +3709,7 @@
         <p:spPr>
           <a:xfrm>
             <a:off x="609600" y="1219200"/>
-            <a:ext cx="7772400" cy="1470025"/>
+            <a:ext cx="8001000" cy="1470025"/>
           </a:xfrm>
         </p:spPr>
         <p:txBody>
@@ -3718,13 +3718,13 @@
           <a:p>
             <a:pPr algn="ctr"/>
             <a:r>
-              <a:rPr lang="en-US"/>
+              <a:rPr lang="en-US" dirty="0"/>
               <a:t>BÁO CÁO HỌC PHẦN PHÁT TRIỂN ỨNG DỤNG DI DỘNG (CT484)</a:t>
             </a:r>
             <a:br>
-              <a:rPr lang="en-US"/>
+              <a:rPr lang="en-US" dirty="0"/>
             </a:br>
-            <a:endParaRPr lang="en-US" altLang="en-US"/>
+            <a:endParaRPr lang="en-US" altLang="en-US" dirty="0"/>
           </a:p>
         </p:txBody>
       </p:sp>

</xml_diff>